<commit_message>
PowerpointPräsentation hinzugefügt für das Projekt
</commit_message>
<xml_diff>
--- a/HTML_Projekt_02_Familiengerichte.pptx
+++ b/HTML_Projekt_02_Familiengerichte.pptx
@@ -204,7 +204,7 @@
           <a:p>
             <a:fld id="{61DD2628-568C-4ACC-9ADC-95D0A32060B7}" type="datetimeFigureOut">
               <a:rPr lang="de-DE" smtClean="0"/>
-              <a:t>05.05.2021</a:t>
+              <a:t>06.05.2021</a:t>
             </a:fld>
             <a:endParaRPr lang="de-DE"/>
           </a:p>
@@ -471,6 +471,1659 @@
 </p:notesMaster>
 </file>
 
+<file path=ppt/notesSlides/notesSlide1.xml><?xml version="1.0" encoding="utf-8"?>
+<p:notes xmlns:a="http://schemas.openxmlformats.org/drawingml/2006/main" xmlns:r="http://schemas.openxmlformats.org/officeDocument/2006/relationships" xmlns:p="http://schemas.openxmlformats.org/presentationml/2006/main">
+  <p:cSld>
+    <p:spTree>
+      <p:nvGrpSpPr>
+        <p:cNvPr id="1" name=""/>
+        <p:cNvGrpSpPr/>
+        <p:nvPr/>
+      </p:nvGrpSpPr>
+      <p:grpSpPr>
+        <a:xfrm>
+          <a:off x="0" y="0"/>
+          <a:ext cx="0" cy="0"/>
+          <a:chOff x="0" y="0"/>
+          <a:chExt cx="0" cy="0"/>
+        </a:xfrm>
+      </p:grpSpPr>
+      <p:sp>
+        <p:nvSpPr>
+          <p:cNvPr id="2" name="Folienbildplatzhalter 1"/>
+          <p:cNvSpPr>
+            <a:spLocks noGrp="1" noRot="1" noChangeAspect="1"/>
+          </p:cNvSpPr>
+          <p:nvPr>
+            <p:ph type="sldImg"/>
+          </p:nvPr>
+        </p:nvSpPr>
+        <p:spPr/>
+      </p:sp>
+      <p:sp>
+        <p:nvSpPr>
+          <p:cNvPr id="3" name="Notizenplatzhalter 2"/>
+          <p:cNvSpPr>
+            <a:spLocks noGrp="1"/>
+          </p:cNvSpPr>
+          <p:nvPr>
+            <p:ph type="body" idx="1"/>
+          </p:nvPr>
+        </p:nvSpPr>
+        <p:spPr/>
+        <p:txBody>
+          <a:bodyPr/>
+          <a:lstStyle/>
+          <a:p>
+            <a:r>
+              <a:rPr lang="de-DE" dirty="0"/>
+              <a:t>Hallo Zusammen </a:t>
+            </a:r>
+            <a:br>
+              <a:rPr lang="de-DE" dirty="0"/>
+            </a:br>
+            <a:r>
+              <a:rPr lang="de-DE" dirty="0"/>
+              <a:t>Ich lade Sie zu meiner HTML-Präsentation „Lieblingsgerichte meiner Familie“ herzlich ein.</a:t>
+            </a:r>
+          </a:p>
+        </p:txBody>
+      </p:sp>
+      <p:sp>
+        <p:nvSpPr>
+          <p:cNvPr id="4" name="Foliennummernplatzhalter 3"/>
+          <p:cNvSpPr>
+            <a:spLocks noGrp="1"/>
+          </p:cNvSpPr>
+          <p:nvPr>
+            <p:ph type="sldNum" sz="quarter" idx="5"/>
+          </p:nvPr>
+        </p:nvSpPr>
+        <p:spPr/>
+        <p:txBody>
+          <a:bodyPr/>
+          <a:lstStyle/>
+          <a:p>
+            <a:fld id="{F08FA16D-42E2-4EC7-990B-293656F6391E}" type="slidenum">
+              <a:rPr lang="de-DE" smtClean="0"/>
+              <a:t>1</a:t>
+            </a:fld>
+            <a:endParaRPr lang="de-DE"/>
+          </a:p>
+        </p:txBody>
+      </p:sp>
+    </p:spTree>
+    <p:extLst>
+      <p:ext uri="{BB962C8B-B14F-4D97-AF65-F5344CB8AC3E}">
+        <p14:creationId xmlns:p14="http://schemas.microsoft.com/office/powerpoint/2010/main" val="1956568219"/>
+      </p:ext>
+    </p:extLst>
+  </p:cSld>
+  <p:clrMapOvr>
+    <a:masterClrMapping/>
+  </p:clrMapOvr>
+</p:notes>
+</file>
+
+<file path=ppt/notesSlides/notesSlide2.xml><?xml version="1.0" encoding="utf-8"?>
+<p:notes xmlns:a="http://schemas.openxmlformats.org/drawingml/2006/main" xmlns:r="http://schemas.openxmlformats.org/officeDocument/2006/relationships" xmlns:p="http://schemas.openxmlformats.org/presentationml/2006/main">
+  <p:cSld>
+    <p:spTree>
+      <p:nvGrpSpPr>
+        <p:cNvPr id="1" name=""/>
+        <p:cNvGrpSpPr/>
+        <p:nvPr/>
+      </p:nvGrpSpPr>
+      <p:grpSpPr>
+        <a:xfrm>
+          <a:off x="0" y="0"/>
+          <a:ext cx="0" cy="0"/>
+          <a:chOff x="0" y="0"/>
+          <a:chExt cx="0" cy="0"/>
+        </a:xfrm>
+      </p:grpSpPr>
+      <p:sp>
+        <p:nvSpPr>
+          <p:cNvPr id="2" name="Folienbildplatzhalter 1"/>
+          <p:cNvSpPr>
+            <a:spLocks noGrp="1" noRot="1" noChangeAspect="1"/>
+          </p:cNvSpPr>
+          <p:nvPr>
+            <p:ph type="sldImg"/>
+          </p:nvPr>
+        </p:nvSpPr>
+        <p:spPr/>
+      </p:sp>
+      <p:sp>
+        <p:nvSpPr>
+          <p:cNvPr id="3" name="Notizenplatzhalter 2"/>
+          <p:cNvSpPr>
+            <a:spLocks noGrp="1"/>
+          </p:cNvSpPr>
+          <p:nvPr>
+            <p:ph type="body" idx="1"/>
+          </p:nvPr>
+        </p:nvSpPr>
+        <p:spPr/>
+        <p:txBody>
+          <a:bodyPr/>
+          <a:lstStyle/>
+          <a:p>
+            <a:pPr indent="-228600">
+              <a:lnSpc>
+                <a:spcPct val="90000"/>
+              </a:lnSpc>
+              <a:spcAft>
+                <a:spcPts val="600"/>
+              </a:spcAft>
+              <a:buFont typeface="Arial" panose="020B0604020202020204" pitchFamily="34" charset="0"/>
+              <a:buChar char="•"/>
+            </a:pPr>
+            <a:r>
+              <a:rPr lang="en-US" sz="1200" b="1" dirty="0" err="1">
+                <a:solidFill>
+                  <a:schemeClr val="bg1">
+                    <a:lumMod val="95000"/>
+                  </a:schemeClr>
+                </a:solidFill>
+              </a:rPr>
+              <a:t>Inhaltsangabe</a:t>
+            </a:r>
+            <a:r>
+              <a:rPr lang="en-US" sz="1200" b="1" dirty="0">
+                <a:solidFill>
+                  <a:schemeClr val="bg1">
+                    <a:lumMod val="95000"/>
+                  </a:schemeClr>
+                </a:solidFill>
+              </a:rPr>
+              <a:t> </a:t>
+            </a:r>
+            <a:r>
+              <a:rPr lang="en-US" sz="1200" b="1" dirty="0" err="1">
+                <a:solidFill>
+                  <a:schemeClr val="bg1">
+                    <a:lumMod val="95000"/>
+                  </a:schemeClr>
+                </a:solidFill>
+              </a:rPr>
+              <a:t>besteht</a:t>
+            </a:r>
+            <a:r>
+              <a:rPr lang="en-US" sz="1200" b="1" dirty="0">
+                <a:solidFill>
+                  <a:schemeClr val="bg1">
+                    <a:lumMod val="95000"/>
+                  </a:schemeClr>
+                </a:solidFill>
+              </a:rPr>
+              <a:t> </a:t>
+            </a:r>
+            <a:r>
+              <a:rPr lang="en-US" sz="1200" b="1" dirty="0" err="1">
+                <a:solidFill>
+                  <a:schemeClr val="bg1">
+                    <a:lumMod val="95000"/>
+                  </a:schemeClr>
+                </a:solidFill>
+              </a:rPr>
+              <a:t>aus</a:t>
+            </a:r>
+            <a:r>
+              <a:rPr lang="en-US" sz="1200" b="1" dirty="0">
+                <a:solidFill>
+                  <a:schemeClr val="bg1">
+                    <a:lumMod val="95000"/>
+                  </a:schemeClr>
+                </a:solidFill>
+              </a:rPr>
+              <a:t>:</a:t>
+            </a:r>
+          </a:p>
+          <a:p>
+            <a:pPr indent="-228600">
+              <a:lnSpc>
+                <a:spcPct val="90000"/>
+              </a:lnSpc>
+              <a:spcAft>
+                <a:spcPts val="600"/>
+              </a:spcAft>
+              <a:buFont typeface="Arial" panose="020B0604020202020204" pitchFamily="34" charset="0"/>
+              <a:buChar char="•"/>
+            </a:pPr>
+            <a:endParaRPr lang="en-US" sz="1200" b="1" dirty="0">
+              <a:solidFill>
+                <a:schemeClr val="bg1">
+                  <a:lumMod val="95000"/>
+                </a:schemeClr>
+              </a:solidFill>
+            </a:endParaRPr>
+          </a:p>
+          <a:p>
+            <a:pPr indent="-228600">
+              <a:lnSpc>
+                <a:spcPct val="90000"/>
+              </a:lnSpc>
+              <a:spcAft>
+                <a:spcPts val="600"/>
+              </a:spcAft>
+              <a:buFont typeface="Arial" panose="020B0604020202020204" pitchFamily="34" charset="0"/>
+              <a:buChar char="•"/>
+            </a:pPr>
+            <a:r>
+              <a:rPr lang="en-US" sz="1200" b="1" dirty="0" err="1">
+                <a:solidFill>
+                  <a:schemeClr val="bg1">
+                    <a:lumMod val="95000"/>
+                  </a:schemeClr>
+                </a:solidFill>
+              </a:rPr>
+              <a:t>Inhaltsangaben</a:t>
+            </a:r>
+            <a:endParaRPr lang="en-US" sz="1200" b="1" dirty="0">
+              <a:solidFill>
+                <a:schemeClr val="bg1">
+                  <a:lumMod val="95000"/>
+                </a:schemeClr>
+              </a:solidFill>
+            </a:endParaRPr>
+          </a:p>
+          <a:p>
+            <a:pPr indent="-228600">
+              <a:lnSpc>
+                <a:spcPct val="90000"/>
+              </a:lnSpc>
+              <a:spcAft>
+                <a:spcPts val="600"/>
+              </a:spcAft>
+              <a:buFont typeface="Arial" panose="020B0604020202020204" pitchFamily="34" charset="0"/>
+              <a:buChar char="•"/>
+            </a:pPr>
+            <a:r>
+              <a:rPr lang="en-US" sz="1200" b="1" dirty="0" err="1">
+                <a:solidFill>
+                  <a:schemeClr val="bg1">
+                    <a:lumMod val="95000"/>
+                  </a:schemeClr>
+                </a:solidFill>
+              </a:rPr>
+              <a:t>Aufgabenstellung</a:t>
+            </a:r>
+            <a:endParaRPr lang="en-US" sz="1200" b="1" dirty="0">
+              <a:solidFill>
+                <a:schemeClr val="bg1">
+                  <a:lumMod val="95000"/>
+                </a:schemeClr>
+              </a:solidFill>
+            </a:endParaRPr>
+          </a:p>
+          <a:p>
+            <a:pPr indent="-228600">
+              <a:lnSpc>
+                <a:spcPct val="90000"/>
+              </a:lnSpc>
+              <a:spcAft>
+                <a:spcPts val="600"/>
+              </a:spcAft>
+              <a:buFont typeface="Arial" panose="020B0604020202020204" pitchFamily="34" charset="0"/>
+              <a:buChar char="•"/>
+            </a:pPr>
+            <a:r>
+              <a:rPr lang="en-US" sz="1200" b="1" dirty="0">
+                <a:solidFill>
+                  <a:schemeClr val="bg1">
+                    <a:lumMod val="95000"/>
+                  </a:schemeClr>
+                </a:solidFill>
+              </a:rPr>
+              <a:t>Layout</a:t>
+            </a:r>
+          </a:p>
+          <a:p>
+            <a:pPr indent="-228600">
+              <a:lnSpc>
+                <a:spcPct val="90000"/>
+              </a:lnSpc>
+              <a:spcAft>
+                <a:spcPts val="600"/>
+              </a:spcAft>
+              <a:buFont typeface="Arial" panose="020B0604020202020204" pitchFamily="34" charset="0"/>
+              <a:buChar char="•"/>
+            </a:pPr>
+            <a:r>
+              <a:rPr lang="en-US" sz="1200" b="1" dirty="0" err="1">
+                <a:solidFill>
+                  <a:schemeClr val="bg1">
+                    <a:lumMod val="95000"/>
+                  </a:schemeClr>
+                </a:solidFill>
+              </a:rPr>
+              <a:t>Ansicht</a:t>
+            </a:r>
+            <a:r>
+              <a:rPr lang="en-US" sz="1200" b="1" dirty="0">
+                <a:solidFill>
+                  <a:schemeClr val="bg1">
+                    <a:lumMod val="95000"/>
+                  </a:schemeClr>
+                </a:solidFill>
+              </a:rPr>
+              <a:t> des Codes</a:t>
+            </a:r>
+          </a:p>
+          <a:p>
+            <a:pPr indent="-228600">
+              <a:lnSpc>
+                <a:spcPct val="90000"/>
+              </a:lnSpc>
+              <a:spcAft>
+                <a:spcPts val="600"/>
+              </a:spcAft>
+              <a:buFont typeface="Arial" panose="020B0604020202020204" pitchFamily="34" charset="0"/>
+              <a:buChar char="•"/>
+            </a:pPr>
+            <a:r>
+              <a:rPr lang="en-US" sz="1200" b="1" dirty="0">
+                <a:solidFill>
+                  <a:schemeClr val="bg1">
+                    <a:lumMod val="95000"/>
+                  </a:schemeClr>
+                </a:solidFill>
+              </a:rPr>
+              <a:t>Dropdown</a:t>
+            </a:r>
+          </a:p>
+          <a:p>
+            <a:pPr indent="-228600">
+              <a:lnSpc>
+                <a:spcPct val="90000"/>
+              </a:lnSpc>
+              <a:spcAft>
+                <a:spcPts val="600"/>
+              </a:spcAft>
+              <a:buFont typeface="Arial" panose="020B0604020202020204" pitchFamily="34" charset="0"/>
+              <a:buChar char="•"/>
+            </a:pPr>
+            <a:r>
+              <a:rPr lang="en-US" sz="1200" b="1" dirty="0">
+                <a:solidFill>
+                  <a:schemeClr val="bg1">
+                    <a:lumMod val="95000"/>
+                  </a:schemeClr>
+                </a:solidFill>
+              </a:rPr>
+              <a:t>PDF (</a:t>
+            </a:r>
+            <a:r>
+              <a:rPr lang="en-US" sz="1200" b="1" dirty="0" err="1">
+                <a:solidFill>
+                  <a:schemeClr val="bg1">
+                    <a:lumMod val="95000"/>
+                  </a:schemeClr>
+                </a:solidFill>
+              </a:rPr>
+              <a:t>Datenschutz</a:t>
+            </a:r>
+            <a:r>
+              <a:rPr lang="en-US" sz="1200" b="1" dirty="0">
+                <a:solidFill>
+                  <a:schemeClr val="bg1">
+                    <a:lumMod val="95000"/>
+                  </a:schemeClr>
+                </a:solidFill>
+              </a:rPr>
+              <a:t>)</a:t>
+            </a:r>
+          </a:p>
+          <a:p>
+            <a:pPr indent="-228600">
+              <a:lnSpc>
+                <a:spcPct val="90000"/>
+              </a:lnSpc>
+              <a:spcAft>
+                <a:spcPts val="600"/>
+              </a:spcAft>
+              <a:buFont typeface="Arial" panose="020B0604020202020204" pitchFamily="34" charset="0"/>
+              <a:buChar char="•"/>
+            </a:pPr>
+            <a:r>
+              <a:rPr lang="en-US" sz="1200" b="1" dirty="0" err="1">
+                <a:solidFill>
+                  <a:schemeClr val="bg1">
+                    <a:lumMod val="95000"/>
+                  </a:schemeClr>
+                </a:solidFill>
+              </a:rPr>
+              <a:t>Fazit</a:t>
+            </a:r>
+            <a:r>
+              <a:rPr lang="en-US" sz="1200" b="1" dirty="0">
+                <a:solidFill>
+                  <a:schemeClr val="bg1">
+                    <a:lumMod val="95000"/>
+                  </a:schemeClr>
+                </a:solidFill>
+              </a:rPr>
+              <a:t> </a:t>
+            </a:r>
+            <a:r>
+              <a:rPr lang="en-US" sz="1200" b="1" dirty="0" err="1">
+                <a:solidFill>
+                  <a:schemeClr val="bg1">
+                    <a:lumMod val="95000"/>
+                  </a:schemeClr>
+                </a:solidFill>
+              </a:rPr>
+              <a:t>für</a:t>
+            </a:r>
+            <a:r>
+              <a:rPr lang="en-US" sz="1200" b="1" dirty="0">
+                <a:solidFill>
+                  <a:schemeClr val="bg1">
+                    <a:lumMod val="95000"/>
+                  </a:schemeClr>
+                </a:solidFill>
+              </a:rPr>
+              <a:t> </a:t>
+            </a:r>
+            <a:r>
+              <a:rPr lang="en-US" sz="1200" b="1" dirty="0" err="1">
+                <a:solidFill>
+                  <a:schemeClr val="bg1">
+                    <a:lumMod val="95000"/>
+                  </a:schemeClr>
+                </a:solidFill>
+              </a:rPr>
+              <a:t>mich</a:t>
+            </a:r>
+            <a:endParaRPr lang="en-US" sz="1200" b="1" dirty="0">
+              <a:solidFill>
+                <a:schemeClr val="bg1">
+                  <a:lumMod val="95000"/>
+                </a:schemeClr>
+              </a:solidFill>
+            </a:endParaRPr>
+          </a:p>
+          <a:p>
+            <a:endParaRPr lang="de-DE" noProof="0" dirty="0"/>
+          </a:p>
+        </p:txBody>
+      </p:sp>
+      <p:sp>
+        <p:nvSpPr>
+          <p:cNvPr id="4" name="Foliennummernplatzhalter 3"/>
+          <p:cNvSpPr>
+            <a:spLocks noGrp="1"/>
+          </p:cNvSpPr>
+          <p:nvPr>
+            <p:ph type="sldNum" sz="quarter" idx="5"/>
+          </p:nvPr>
+        </p:nvSpPr>
+        <p:spPr/>
+        <p:txBody>
+          <a:bodyPr/>
+          <a:lstStyle/>
+          <a:p>
+            <a:fld id="{F08FA16D-42E2-4EC7-990B-293656F6391E}" type="slidenum">
+              <a:rPr lang="de-DE" smtClean="0"/>
+              <a:t>2</a:t>
+            </a:fld>
+            <a:endParaRPr lang="de-DE"/>
+          </a:p>
+        </p:txBody>
+      </p:sp>
+    </p:spTree>
+    <p:extLst>
+      <p:ext uri="{BB962C8B-B14F-4D97-AF65-F5344CB8AC3E}">
+        <p14:creationId xmlns:p14="http://schemas.microsoft.com/office/powerpoint/2010/main" val="4055290994"/>
+      </p:ext>
+    </p:extLst>
+  </p:cSld>
+  <p:clrMapOvr>
+    <a:masterClrMapping/>
+  </p:clrMapOvr>
+</p:notes>
+</file>
+
+<file path=ppt/notesSlides/notesSlide3.xml><?xml version="1.0" encoding="utf-8"?>
+<p:notes xmlns:a="http://schemas.openxmlformats.org/drawingml/2006/main" xmlns:r="http://schemas.openxmlformats.org/officeDocument/2006/relationships" xmlns:p="http://schemas.openxmlformats.org/presentationml/2006/main">
+  <p:cSld>
+    <p:spTree>
+      <p:nvGrpSpPr>
+        <p:cNvPr id="1" name=""/>
+        <p:cNvGrpSpPr/>
+        <p:nvPr/>
+      </p:nvGrpSpPr>
+      <p:grpSpPr>
+        <a:xfrm>
+          <a:off x="0" y="0"/>
+          <a:ext cx="0" cy="0"/>
+          <a:chOff x="0" y="0"/>
+          <a:chExt cx="0" cy="0"/>
+        </a:xfrm>
+      </p:grpSpPr>
+      <p:sp>
+        <p:nvSpPr>
+          <p:cNvPr id="2" name="Folienbildplatzhalter 1"/>
+          <p:cNvSpPr>
+            <a:spLocks noGrp="1" noRot="1" noChangeAspect="1"/>
+          </p:cNvSpPr>
+          <p:nvPr>
+            <p:ph type="sldImg"/>
+          </p:nvPr>
+        </p:nvSpPr>
+        <p:spPr/>
+      </p:sp>
+      <p:sp>
+        <p:nvSpPr>
+          <p:cNvPr id="3" name="Notizenplatzhalter 2"/>
+          <p:cNvSpPr>
+            <a:spLocks noGrp="1"/>
+          </p:cNvSpPr>
+          <p:nvPr>
+            <p:ph type="body" idx="1"/>
+          </p:nvPr>
+        </p:nvSpPr>
+        <p:spPr/>
+        <p:txBody>
+          <a:bodyPr/>
+          <a:lstStyle/>
+          <a:p>
+            <a:r>
+              <a:rPr lang="de-DE" sz="1200" dirty="0">
+                <a:solidFill>
+                  <a:srgbClr val="FFFFFF"/>
+                </a:solidFill>
+              </a:rPr>
+              <a:t>Aufgabenstellung:</a:t>
+            </a:r>
+          </a:p>
+          <a:p>
+            <a:endParaRPr lang="de-DE" sz="1200" dirty="0">
+              <a:solidFill>
+                <a:srgbClr val="FFFFFF"/>
+              </a:solidFill>
+            </a:endParaRPr>
+          </a:p>
+          <a:p>
+            <a:pPr algn="l">
+              <a:spcBef>
+                <a:spcPts val="600"/>
+              </a:spcBef>
+            </a:pPr>
+            <a:r>
+              <a:rPr lang="de-DE" sz="1200" b="1" dirty="0">
+                <a:solidFill>
+                  <a:schemeClr val="bg1">
+                    <a:lumMod val="95000"/>
+                  </a:schemeClr>
+                </a:solidFill>
+              </a:rPr>
+              <a:t>01_01_Ein individuelles Webseiten-Design auf allen Seiten</a:t>
+            </a:r>
+          </a:p>
+          <a:p>
+            <a:pPr lvl="0" algn="l">
+              <a:spcBef>
+                <a:spcPts val="600"/>
+              </a:spcBef>
+            </a:pPr>
+            <a:r>
+              <a:rPr lang="de-DE" sz="1200" b="1" dirty="0">
+                <a:solidFill>
+                  <a:schemeClr val="bg1">
+                    <a:lumMod val="95000"/>
+                  </a:schemeClr>
+                </a:solidFill>
+              </a:rPr>
+              <a:t>01_02_Mindestens fünf Seiten (incl. Index und Impressum)</a:t>
+            </a:r>
+          </a:p>
+          <a:p>
+            <a:pPr lvl="0" algn="l">
+              <a:spcBef>
+                <a:spcPts val="600"/>
+              </a:spcBef>
+            </a:pPr>
+            <a:r>
+              <a:rPr lang="de-DE" sz="1200" b="1" dirty="0">
+                <a:solidFill>
+                  <a:schemeClr val="bg1">
+                    <a:lumMod val="95000"/>
+                  </a:schemeClr>
+                </a:solidFill>
+              </a:rPr>
+              <a:t>01_03_Links von jeder Seite auf jede andere Seite</a:t>
+            </a:r>
+          </a:p>
+          <a:p>
+            <a:pPr lvl="0" algn="l">
+              <a:spcBef>
+                <a:spcPts val="600"/>
+              </a:spcBef>
+            </a:pPr>
+            <a:r>
+              <a:rPr lang="de-DE" sz="1200" b="1" dirty="0">
+                <a:solidFill>
+                  <a:schemeClr val="bg1">
+                    <a:lumMod val="95000"/>
+                  </a:schemeClr>
+                </a:solidFill>
+              </a:rPr>
+              <a:t>01_04_Eine Seite mit mindestens 10 Bilder, die mit Lightbox-Effekt </a:t>
+            </a:r>
+          </a:p>
+          <a:p>
+            <a:pPr lvl="0" algn="l">
+              <a:spcBef>
+                <a:spcPts val="600"/>
+              </a:spcBef>
+            </a:pPr>
+            <a:r>
+              <a:rPr lang="de-DE" sz="1200" b="1" dirty="0">
+                <a:solidFill>
+                  <a:schemeClr val="bg1">
+                    <a:lumMod val="95000"/>
+                  </a:schemeClr>
+                </a:solidFill>
+              </a:rPr>
+              <a:t>01_05_responsives Design</a:t>
+            </a:r>
+          </a:p>
+          <a:p>
+            <a:pPr algn="l">
+              <a:spcBef>
+                <a:spcPts val="600"/>
+              </a:spcBef>
+            </a:pPr>
+            <a:r>
+              <a:rPr lang="de-DE" sz="1200" b="1" dirty="0">
+                <a:solidFill>
+                  <a:schemeClr val="bg1">
+                    <a:lumMod val="95000"/>
+                  </a:schemeClr>
+                </a:solidFill>
+              </a:rPr>
+              <a:t>01_06_Formular</a:t>
+            </a:r>
+          </a:p>
+          <a:p>
+            <a:pPr algn="l">
+              <a:spcBef>
+                <a:spcPts val="600"/>
+              </a:spcBef>
+            </a:pPr>
+            <a:r>
+              <a:rPr lang="de-DE" sz="1200" b="1" dirty="0">
+                <a:solidFill>
+                  <a:schemeClr val="bg1">
+                    <a:lumMod val="95000"/>
+                  </a:schemeClr>
+                </a:solidFill>
+              </a:rPr>
+              <a:t>01_07_Power Point über das Projekt</a:t>
+            </a:r>
+          </a:p>
+          <a:p>
+            <a:endParaRPr lang="de-DE" dirty="0"/>
+          </a:p>
+        </p:txBody>
+      </p:sp>
+      <p:sp>
+        <p:nvSpPr>
+          <p:cNvPr id="4" name="Foliennummernplatzhalter 3"/>
+          <p:cNvSpPr>
+            <a:spLocks noGrp="1"/>
+          </p:cNvSpPr>
+          <p:nvPr>
+            <p:ph type="sldNum" sz="quarter" idx="5"/>
+          </p:nvPr>
+        </p:nvSpPr>
+        <p:spPr/>
+        <p:txBody>
+          <a:bodyPr/>
+          <a:lstStyle/>
+          <a:p>
+            <a:fld id="{F08FA16D-42E2-4EC7-990B-293656F6391E}" type="slidenum">
+              <a:rPr lang="de-DE" smtClean="0"/>
+              <a:t>3</a:t>
+            </a:fld>
+            <a:endParaRPr lang="de-DE"/>
+          </a:p>
+        </p:txBody>
+      </p:sp>
+    </p:spTree>
+    <p:extLst>
+      <p:ext uri="{BB962C8B-B14F-4D97-AF65-F5344CB8AC3E}">
+        <p14:creationId xmlns:p14="http://schemas.microsoft.com/office/powerpoint/2010/main" val="891567252"/>
+      </p:ext>
+    </p:extLst>
+  </p:cSld>
+  <p:clrMapOvr>
+    <a:masterClrMapping/>
+  </p:clrMapOvr>
+</p:notes>
+</file>
+
+<file path=ppt/notesSlides/notesSlide4.xml><?xml version="1.0" encoding="utf-8"?>
+<p:notes xmlns:a="http://schemas.openxmlformats.org/drawingml/2006/main" xmlns:r="http://schemas.openxmlformats.org/officeDocument/2006/relationships" xmlns:p="http://schemas.openxmlformats.org/presentationml/2006/main">
+  <p:cSld>
+    <p:spTree>
+      <p:nvGrpSpPr>
+        <p:cNvPr id="1" name=""/>
+        <p:cNvGrpSpPr/>
+        <p:nvPr/>
+      </p:nvGrpSpPr>
+      <p:grpSpPr>
+        <a:xfrm>
+          <a:off x="0" y="0"/>
+          <a:ext cx="0" cy="0"/>
+          <a:chOff x="0" y="0"/>
+          <a:chExt cx="0" cy="0"/>
+        </a:xfrm>
+      </p:grpSpPr>
+      <p:sp>
+        <p:nvSpPr>
+          <p:cNvPr id="2" name="Folienbildplatzhalter 1"/>
+          <p:cNvSpPr>
+            <a:spLocks noGrp="1" noRot="1" noChangeAspect="1"/>
+          </p:cNvSpPr>
+          <p:nvPr>
+            <p:ph type="sldImg"/>
+          </p:nvPr>
+        </p:nvSpPr>
+        <p:spPr/>
+      </p:sp>
+      <p:sp>
+        <p:nvSpPr>
+          <p:cNvPr id="3" name="Notizenplatzhalter 2"/>
+          <p:cNvSpPr>
+            <a:spLocks noGrp="1"/>
+          </p:cNvSpPr>
+          <p:nvPr>
+            <p:ph type="body" idx="1"/>
+          </p:nvPr>
+        </p:nvSpPr>
+        <p:spPr/>
+        <p:txBody>
+          <a:bodyPr/>
+          <a:lstStyle/>
+          <a:p>
+            <a:r>
+              <a:rPr lang="de-DE" sz="1200" dirty="0">
+                <a:solidFill>
+                  <a:srgbClr val="FFFFFF"/>
+                </a:solidFill>
+              </a:rPr>
+              <a:t>Layout:</a:t>
+            </a:r>
+          </a:p>
+          <a:p>
+            <a:endParaRPr lang="de-DE" sz="1200" dirty="0">
+              <a:solidFill>
+                <a:srgbClr val="FFFFFF"/>
+              </a:solidFill>
+            </a:endParaRPr>
+          </a:p>
+          <a:p>
+            <a:r>
+              <a:rPr lang="de-DE" sz="1200" dirty="0">
+                <a:solidFill>
+                  <a:srgbClr val="FFFFFF"/>
+                </a:solidFill>
+              </a:rPr>
+              <a:t>Head	=&gt;	 </a:t>
+            </a:r>
+            <a:r>
+              <a:rPr lang="de-DE" sz="1200" dirty="0" err="1">
+                <a:solidFill>
+                  <a:srgbClr val="FFFFFF"/>
+                </a:solidFill>
+              </a:rPr>
+              <a:t>Navbar</a:t>
+            </a:r>
+            <a:r>
+              <a:rPr lang="de-DE" sz="1200" dirty="0">
+                <a:solidFill>
+                  <a:srgbClr val="FFFFFF"/>
+                </a:solidFill>
+              </a:rPr>
+              <a:t> ;</a:t>
+            </a:r>
+          </a:p>
+          <a:p>
+            <a:r>
+              <a:rPr lang="de-DE" sz="1200" dirty="0">
+                <a:solidFill>
+                  <a:srgbClr val="FFFFFF"/>
+                </a:solidFill>
+              </a:rPr>
+              <a:t>Center	=&gt;	Bilder des Rezeptes;</a:t>
+            </a:r>
+            <a:br>
+              <a:rPr lang="de-DE" sz="1200" dirty="0">
+                <a:solidFill>
+                  <a:srgbClr val="FFFFFF"/>
+                </a:solidFill>
+              </a:rPr>
+            </a:br>
+            <a:r>
+              <a:rPr lang="de-DE" sz="1200" dirty="0">
+                <a:solidFill>
+                  <a:srgbClr val="FFFFFF"/>
+                </a:solidFill>
+              </a:rPr>
+              <a:t>		Zeichnung Koch;</a:t>
+            </a:r>
+          </a:p>
+          <a:p>
+            <a:r>
+              <a:rPr lang="de-DE" sz="1200" dirty="0">
+                <a:solidFill>
+                  <a:srgbClr val="FFFFFF"/>
+                </a:solidFill>
+              </a:rPr>
+              <a:t>		Rezeptanleitung;</a:t>
+            </a:r>
+          </a:p>
+          <a:p>
+            <a:r>
+              <a:rPr lang="de-DE" sz="1200" dirty="0">
+                <a:solidFill>
+                  <a:srgbClr val="FFFFFF"/>
+                </a:solidFill>
+              </a:rPr>
+              <a:t>		Zutaten</a:t>
+            </a:r>
+          </a:p>
+          <a:p>
+            <a:r>
+              <a:rPr lang="de-DE" sz="1200" dirty="0" err="1">
+                <a:solidFill>
+                  <a:srgbClr val="FFFFFF"/>
+                </a:solidFill>
+              </a:rPr>
+              <a:t>Footer</a:t>
+            </a:r>
+            <a:r>
+              <a:rPr lang="de-DE" sz="1200" dirty="0">
+                <a:solidFill>
+                  <a:srgbClr val="FFFFFF"/>
+                </a:solidFill>
+              </a:rPr>
+              <a:t>	=&gt; Links für=&gt;	Home,</a:t>
+            </a:r>
+          </a:p>
+          <a:p>
+            <a:r>
+              <a:rPr lang="de-DE" sz="1200" dirty="0">
+                <a:solidFill>
+                  <a:srgbClr val="FFFFFF"/>
+                </a:solidFill>
+              </a:rPr>
+              <a:t>			Impressum, </a:t>
+            </a:r>
+          </a:p>
+          <a:p>
+            <a:r>
+              <a:rPr lang="de-DE" sz="1200" dirty="0">
+                <a:solidFill>
+                  <a:srgbClr val="FFFFFF"/>
+                </a:solidFill>
+              </a:rPr>
+              <a:t>			Datenschutz,</a:t>
+            </a:r>
+          </a:p>
+          <a:p>
+            <a:r>
+              <a:rPr lang="de-DE" sz="1200" dirty="0">
+                <a:solidFill>
+                  <a:srgbClr val="FFFFFF"/>
+                </a:solidFill>
+              </a:rPr>
+              <a:t>			Stand der </a:t>
+            </a:r>
+            <a:r>
+              <a:rPr lang="de-DE" sz="1200" dirty="0" err="1">
+                <a:solidFill>
+                  <a:srgbClr val="FFFFFF"/>
+                </a:solidFill>
+              </a:rPr>
+              <a:t>letzen</a:t>
+            </a:r>
+            <a:r>
+              <a:rPr lang="de-DE" sz="1200" dirty="0">
+                <a:solidFill>
+                  <a:srgbClr val="FFFFFF"/>
+                </a:solidFill>
+              </a:rPr>
+              <a:t> Aktualisierung</a:t>
+            </a:r>
+          </a:p>
+        </p:txBody>
+      </p:sp>
+      <p:sp>
+        <p:nvSpPr>
+          <p:cNvPr id="4" name="Foliennummernplatzhalter 3"/>
+          <p:cNvSpPr>
+            <a:spLocks noGrp="1"/>
+          </p:cNvSpPr>
+          <p:nvPr>
+            <p:ph type="sldNum" sz="quarter" idx="5"/>
+          </p:nvPr>
+        </p:nvSpPr>
+        <p:spPr/>
+        <p:txBody>
+          <a:bodyPr/>
+          <a:lstStyle/>
+          <a:p>
+            <a:fld id="{F08FA16D-42E2-4EC7-990B-293656F6391E}" type="slidenum">
+              <a:rPr lang="de-DE" smtClean="0"/>
+              <a:t>4</a:t>
+            </a:fld>
+            <a:endParaRPr lang="de-DE"/>
+          </a:p>
+        </p:txBody>
+      </p:sp>
+    </p:spTree>
+    <p:extLst>
+      <p:ext uri="{BB962C8B-B14F-4D97-AF65-F5344CB8AC3E}">
+        <p14:creationId xmlns:p14="http://schemas.microsoft.com/office/powerpoint/2010/main" val="420421743"/>
+      </p:ext>
+    </p:extLst>
+  </p:cSld>
+  <p:clrMapOvr>
+    <a:masterClrMapping/>
+  </p:clrMapOvr>
+</p:notes>
+</file>
+
+<file path=ppt/notesSlides/notesSlide5.xml><?xml version="1.0" encoding="utf-8"?>
+<p:notes xmlns:a="http://schemas.openxmlformats.org/drawingml/2006/main" xmlns:r="http://schemas.openxmlformats.org/officeDocument/2006/relationships" xmlns:p="http://schemas.openxmlformats.org/presentationml/2006/main">
+  <p:cSld>
+    <p:spTree>
+      <p:nvGrpSpPr>
+        <p:cNvPr id="1" name=""/>
+        <p:cNvGrpSpPr/>
+        <p:nvPr/>
+      </p:nvGrpSpPr>
+      <p:grpSpPr>
+        <a:xfrm>
+          <a:off x="0" y="0"/>
+          <a:ext cx="0" cy="0"/>
+          <a:chOff x="0" y="0"/>
+          <a:chExt cx="0" cy="0"/>
+        </a:xfrm>
+      </p:grpSpPr>
+      <p:sp>
+        <p:nvSpPr>
+          <p:cNvPr id="2" name="Folienbildplatzhalter 1"/>
+          <p:cNvSpPr>
+            <a:spLocks noGrp="1" noRot="1" noChangeAspect="1"/>
+          </p:cNvSpPr>
+          <p:nvPr>
+            <p:ph type="sldImg"/>
+          </p:nvPr>
+        </p:nvSpPr>
+        <p:spPr/>
+      </p:sp>
+      <p:sp>
+        <p:nvSpPr>
+          <p:cNvPr id="3" name="Notizenplatzhalter 2"/>
+          <p:cNvSpPr>
+            <a:spLocks noGrp="1"/>
+          </p:cNvSpPr>
+          <p:nvPr>
+            <p:ph type="body" idx="1"/>
+          </p:nvPr>
+        </p:nvSpPr>
+        <p:spPr/>
+        <p:txBody>
+          <a:bodyPr/>
+          <a:lstStyle/>
+          <a:p>
+            <a:r>
+              <a:rPr lang="de-DE" dirty="0"/>
+              <a:t>Ansicht des Codes:</a:t>
+            </a:r>
+            <a:br>
+              <a:rPr lang="de-DE" dirty="0"/>
+            </a:br>
+            <a:endParaRPr lang="de-DE" dirty="0"/>
+          </a:p>
+          <a:p>
+            <a:r>
+              <a:rPr lang="de-DE" dirty="0"/>
+              <a:t>Auf Zeile 178 		=&gt; wurde das Bild vom Gericht eingefügt</a:t>
+            </a:r>
+          </a:p>
+          <a:p>
+            <a:endParaRPr lang="de-DE" dirty="0"/>
+          </a:p>
+          <a:p>
+            <a:r>
+              <a:rPr lang="de-DE" dirty="0"/>
+              <a:t>Auf Zeile 182 		=&gt; Bilder der Zeichnung</a:t>
+            </a:r>
+          </a:p>
+          <a:p>
+            <a:endParaRPr lang="de-DE" dirty="0"/>
+          </a:p>
+          <a:p>
+            <a:r>
+              <a:rPr lang="de-DE" dirty="0"/>
+              <a:t>Auf Zeile 186-219	=&gt; Textbereich =&gt; Rezept und Zutaten</a:t>
+            </a:r>
+          </a:p>
+        </p:txBody>
+      </p:sp>
+      <p:sp>
+        <p:nvSpPr>
+          <p:cNvPr id="4" name="Foliennummernplatzhalter 3"/>
+          <p:cNvSpPr>
+            <a:spLocks noGrp="1"/>
+          </p:cNvSpPr>
+          <p:nvPr>
+            <p:ph type="sldNum" sz="quarter" idx="5"/>
+          </p:nvPr>
+        </p:nvSpPr>
+        <p:spPr/>
+        <p:txBody>
+          <a:bodyPr/>
+          <a:lstStyle/>
+          <a:p>
+            <a:fld id="{F08FA16D-42E2-4EC7-990B-293656F6391E}" type="slidenum">
+              <a:rPr lang="de-DE" smtClean="0"/>
+              <a:t>5</a:t>
+            </a:fld>
+            <a:endParaRPr lang="de-DE"/>
+          </a:p>
+        </p:txBody>
+      </p:sp>
+    </p:spTree>
+    <p:extLst>
+      <p:ext uri="{BB962C8B-B14F-4D97-AF65-F5344CB8AC3E}">
+        <p14:creationId xmlns:p14="http://schemas.microsoft.com/office/powerpoint/2010/main" val="3073739813"/>
+      </p:ext>
+    </p:extLst>
+  </p:cSld>
+  <p:clrMapOvr>
+    <a:masterClrMapping/>
+  </p:clrMapOvr>
+</p:notes>
+</file>
+
+<file path=ppt/notesSlides/notesSlide6.xml><?xml version="1.0" encoding="utf-8"?>
+<p:notes xmlns:a="http://schemas.openxmlformats.org/drawingml/2006/main" xmlns:r="http://schemas.openxmlformats.org/officeDocument/2006/relationships" xmlns:p="http://schemas.openxmlformats.org/presentationml/2006/main">
+  <p:cSld>
+    <p:spTree>
+      <p:nvGrpSpPr>
+        <p:cNvPr id="1" name=""/>
+        <p:cNvGrpSpPr/>
+        <p:nvPr/>
+      </p:nvGrpSpPr>
+      <p:grpSpPr>
+        <a:xfrm>
+          <a:off x="0" y="0"/>
+          <a:ext cx="0" cy="0"/>
+          <a:chOff x="0" y="0"/>
+          <a:chExt cx="0" cy="0"/>
+        </a:xfrm>
+      </p:grpSpPr>
+      <p:sp>
+        <p:nvSpPr>
+          <p:cNvPr id="2" name="Folienbildplatzhalter 1"/>
+          <p:cNvSpPr>
+            <a:spLocks noGrp="1" noRot="1" noChangeAspect="1"/>
+          </p:cNvSpPr>
+          <p:nvPr>
+            <p:ph type="sldImg"/>
+          </p:nvPr>
+        </p:nvSpPr>
+        <p:spPr/>
+      </p:sp>
+      <p:sp>
+        <p:nvSpPr>
+          <p:cNvPr id="3" name="Notizenplatzhalter 2"/>
+          <p:cNvSpPr>
+            <a:spLocks noGrp="1"/>
+          </p:cNvSpPr>
+          <p:nvPr>
+            <p:ph type="body" idx="1"/>
+          </p:nvPr>
+        </p:nvSpPr>
+        <p:spPr/>
+        <p:txBody>
+          <a:bodyPr/>
+          <a:lstStyle/>
+          <a:p>
+            <a:pPr marL="0" marR="0" lvl="0" indent="0" algn="l" defTabSz="914400" rtl="0" eaLnBrk="1" fontAlgn="auto" latinLnBrk="0" hangingPunct="1">
+              <a:lnSpc>
+                <a:spcPct val="100000"/>
+              </a:lnSpc>
+              <a:spcBef>
+                <a:spcPts val="0"/>
+              </a:spcBef>
+              <a:spcAft>
+                <a:spcPts val="0"/>
+              </a:spcAft>
+              <a:buClrTx/>
+              <a:buSzTx/>
+              <a:buFontTx/>
+              <a:buNone/>
+              <a:tabLst/>
+              <a:defRPr/>
+            </a:pPr>
+            <a:r>
+              <a:rPr lang="de-DE" sz="1200" dirty="0">
+                <a:solidFill>
+                  <a:srgbClr val="FFFFFF"/>
+                </a:solidFill>
+              </a:rPr>
+              <a:t>Dropdown:</a:t>
+            </a:r>
+          </a:p>
+          <a:p>
+            <a:pPr marL="0" marR="0" lvl="0" indent="0" algn="l" defTabSz="914400" rtl="0" eaLnBrk="1" fontAlgn="auto" latinLnBrk="0" hangingPunct="1">
+              <a:lnSpc>
+                <a:spcPct val="100000"/>
+              </a:lnSpc>
+              <a:spcBef>
+                <a:spcPts val="0"/>
+              </a:spcBef>
+              <a:spcAft>
+                <a:spcPts val="0"/>
+              </a:spcAft>
+              <a:buClrTx/>
+              <a:buSzTx/>
+              <a:buFontTx/>
+              <a:buNone/>
+              <a:tabLst/>
+              <a:defRPr/>
+            </a:pPr>
+            <a:endParaRPr lang="de-DE" sz="1200" dirty="0">
+              <a:solidFill>
+                <a:srgbClr val="FFFFFF"/>
+              </a:solidFill>
+            </a:endParaRPr>
+          </a:p>
+          <a:p>
+            <a:pPr marL="0" marR="0" lvl="0" indent="0" algn="l" defTabSz="914400" rtl="0" eaLnBrk="1" fontAlgn="auto" latinLnBrk="0" hangingPunct="1">
+              <a:lnSpc>
+                <a:spcPct val="100000"/>
+              </a:lnSpc>
+              <a:spcBef>
+                <a:spcPts val="0"/>
+              </a:spcBef>
+              <a:spcAft>
+                <a:spcPts val="0"/>
+              </a:spcAft>
+              <a:buClrTx/>
+              <a:buSzTx/>
+              <a:buFontTx/>
+              <a:buNone/>
+              <a:tabLst/>
+              <a:defRPr/>
+            </a:pPr>
+            <a:r>
+              <a:rPr lang="de-DE" sz="1200" dirty="0">
+                <a:solidFill>
+                  <a:srgbClr val="FFFFFF"/>
+                </a:solidFill>
+              </a:rPr>
+              <a:t>1.Bild =&gt;Gesamtauflistung der Kategorie Suppen</a:t>
+            </a:r>
+          </a:p>
+          <a:p>
+            <a:pPr marL="0" marR="0" lvl="0" indent="0" algn="l" defTabSz="914400" rtl="0" eaLnBrk="1" fontAlgn="auto" latinLnBrk="0" hangingPunct="1">
+              <a:lnSpc>
+                <a:spcPct val="100000"/>
+              </a:lnSpc>
+              <a:spcBef>
+                <a:spcPts val="0"/>
+              </a:spcBef>
+              <a:spcAft>
+                <a:spcPts val="0"/>
+              </a:spcAft>
+              <a:buClrTx/>
+              <a:buSzTx/>
+              <a:buFontTx/>
+              <a:buNone/>
+              <a:tabLst/>
+              <a:defRPr/>
+            </a:pPr>
+            <a:endParaRPr lang="de-DE" sz="1200" dirty="0">
+              <a:solidFill>
+                <a:srgbClr val="FFFFFF"/>
+              </a:solidFill>
+            </a:endParaRPr>
+          </a:p>
+          <a:p>
+            <a:pPr marL="0" marR="0" lvl="0" indent="0" algn="l" defTabSz="914400" rtl="0" eaLnBrk="1" fontAlgn="auto" latinLnBrk="0" hangingPunct="1">
+              <a:lnSpc>
+                <a:spcPct val="100000"/>
+              </a:lnSpc>
+              <a:spcBef>
+                <a:spcPts val="0"/>
+              </a:spcBef>
+              <a:spcAft>
+                <a:spcPts val="0"/>
+              </a:spcAft>
+              <a:buClrTx/>
+              <a:buSzTx/>
+              <a:buFontTx/>
+              <a:buNone/>
+              <a:tabLst/>
+              <a:defRPr/>
+            </a:pPr>
+            <a:r>
+              <a:rPr lang="de-DE" sz="1200" dirty="0">
+                <a:solidFill>
+                  <a:srgbClr val="FFFFFF"/>
+                </a:solidFill>
+              </a:rPr>
+              <a:t>2. Bild Befehl für Dropdown Kartoffelsuppe</a:t>
+            </a:r>
+          </a:p>
+          <a:p>
+            <a:pPr marL="0" marR="0" lvl="0" indent="0" algn="l" defTabSz="914400" rtl="0" eaLnBrk="1" fontAlgn="auto" latinLnBrk="0" hangingPunct="1">
+              <a:lnSpc>
+                <a:spcPct val="100000"/>
+              </a:lnSpc>
+              <a:spcBef>
+                <a:spcPts val="0"/>
+              </a:spcBef>
+              <a:spcAft>
+                <a:spcPts val="0"/>
+              </a:spcAft>
+              <a:buClrTx/>
+              <a:buSzTx/>
+              <a:buFontTx/>
+              <a:buNone/>
+              <a:tabLst/>
+              <a:defRPr/>
+            </a:pPr>
+            <a:endParaRPr lang="de-DE" sz="1200" dirty="0">
+              <a:solidFill>
+                <a:srgbClr val="FFFFFF"/>
+              </a:solidFill>
+            </a:endParaRPr>
+          </a:p>
+          <a:p>
+            <a:pPr marL="0" marR="0" lvl="0" indent="0" algn="l" defTabSz="914400" rtl="0" eaLnBrk="1" fontAlgn="auto" latinLnBrk="0" hangingPunct="1">
+              <a:lnSpc>
+                <a:spcPct val="100000"/>
+              </a:lnSpc>
+              <a:spcBef>
+                <a:spcPts val="0"/>
+              </a:spcBef>
+              <a:spcAft>
+                <a:spcPts val="0"/>
+              </a:spcAft>
+              <a:buClrTx/>
+              <a:buSzTx/>
+              <a:buFontTx/>
+              <a:buNone/>
+              <a:tabLst/>
+              <a:defRPr/>
+            </a:pPr>
+            <a:r>
+              <a:rPr lang="de-DE" sz="1200" dirty="0">
+                <a:solidFill>
+                  <a:srgbClr val="FFFFFF"/>
+                </a:solidFill>
+              </a:rPr>
+              <a:t>3.) Darstellung im Browser</a:t>
+            </a:r>
+          </a:p>
+        </p:txBody>
+      </p:sp>
+      <p:sp>
+        <p:nvSpPr>
+          <p:cNvPr id="4" name="Foliennummernplatzhalter 3"/>
+          <p:cNvSpPr>
+            <a:spLocks noGrp="1"/>
+          </p:cNvSpPr>
+          <p:nvPr>
+            <p:ph type="sldNum" sz="quarter" idx="5"/>
+          </p:nvPr>
+        </p:nvSpPr>
+        <p:spPr/>
+        <p:txBody>
+          <a:bodyPr/>
+          <a:lstStyle/>
+          <a:p>
+            <a:fld id="{F08FA16D-42E2-4EC7-990B-293656F6391E}" type="slidenum">
+              <a:rPr lang="de-DE" smtClean="0"/>
+              <a:t>6</a:t>
+            </a:fld>
+            <a:endParaRPr lang="de-DE"/>
+          </a:p>
+        </p:txBody>
+      </p:sp>
+    </p:spTree>
+    <p:extLst>
+      <p:ext uri="{BB962C8B-B14F-4D97-AF65-F5344CB8AC3E}">
+        <p14:creationId xmlns:p14="http://schemas.microsoft.com/office/powerpoint/2010/main" val="1012548098"/>
+      </p:ext>
+    </p:extLst>
+  </p:cSld>
+  <p:clrMapOvr>
+    <a:masterClrMapping/>
+  </p:clrMapOvr>
+</p:notes>
+</file>
+
+<file path=ppt/notesSlides/notesSlide7.xml><?xml version="1.0" encoding="utf-8"?>
+<p:notes xmlns:a="http://schemas.openxmlformats.org/drawingml/2006/main" xmlns:r="http://schemas.openxmlformats.org/officeDocument/2006/relationships" xmlns:p="http://schemas.openxmlformats.org/presentationml/2006/main">
+  <p:cSld>
+    <p:spTree>
+      <p:nvGrpSpPr>
+        <p:cNvPr id="1" name=""/>
+        <p:cNvGrpSpPr/>
+        <p:nvPr/>
+      </p:nvGrpSpPr>
+      <p:grpSpPr>
+        <a:xfrm>
+          <a:off x="0" y="0"/>
+          <a:ext cx="0" cy="0"/>
+          <a:chOff x="0" y="0"/>
+          <a:chExt cx="0" cy="0"/>
+        </a:xfrm>
+      </p:grpSpPr>
+      <p:sp>
+        <p:nvSpPr>
+          <p:cNvPr id="2" name="Folienbildplatzhalter 1"/>
+          <p:cNvSpPr>
+            <a:spLocks noGrp="1" noRot="1" noChangeAspect="1"/>
+          </p:cNvSpPr>
+          <p:nvPr>
+            <p:ph type="sldImg"/>
+          </p:nvPr>
+        </p:nvSpPr>
+        <p:spPr/>
+      </p:sp>
+      <p:sp>
+        <p:nvSpPr>
+          <p:cNvPr id="3" name="Notizenplatzhalter 2"/>
+          <p:cNvSpPr>
+            <a:spLocks noGrp="1"/>
+          </p:cNvSpPr>
+          <p:nvPr>
+            <p:ph type="body" idx="1"/>
+          </p:nvPr>
+        </p:nvSpPr>
+        <p:spPr/>
+        <p:txBody>
+          <a:bodyPr/>
+          <a:lstStyle/>
+          <a:p>
+            <a:r>
+              <a:rPr lang="de-DE" dirty="0"/>
+              <a:t>PDF:</a:t>
+            </a:r>
+          </a:p>
+          <a:p>
+            <a:endParaRPr lang="de-DE" dirty="0"/>
+          </a:p>
+          <a:p>
+            <a:r>
+              <a:rPr lang="de-DE" dirty="0" err="1"/>
+              <a:t>Worddoument</a:t>
+            </a:r>
+            <a:r>
+              <a:rPr lang="de-DE" dirty="0"/>
+              <a:t> erstellt=&gt; abgespeichert als PDF</a:t>
+            </a:r>
+          </a:p>
+          <a:p>
+            <a:endParaRPr lang="de-DE" dirty="0"/>
+          </a:p>
+          <a:p>
+            <a:r>
+              <a:rPr lang="de-DE" dirty="0"/>
+              <a:t>Bild 2 Code in VSC</a:t>
+            </a:r>
+          </a:p>
+          <a:p>
+            <a:endParaRPr lang="de-DE" dirty="0"/>
+          </a:p>
+          <a:p>
+            <a:r>
+              <a:rPr lang="de-DE" dirty="0"/>
+              <a:t>Bild 3 Darstellung im Browser</a:t>
+            </a:r>
+          </a:p>
+          <a:p>
+            <a:br>
+              <a:rPr lang="de-DE" dirty="0"/>
+            </a:br>
+            <a:r>
+              <a:rPr lang="de-DE" dirty="0"/>
+              <a:t>=&gt; Druckfunktion und Speicherfunktion funktionieren</a:t>
+            </a:r>
+          </a:p>
+        </p:txBody>
+      </p:sp>
+      <p:sp>
+        <p:nvSpPr>
+          <p:cNvPr id="4" name="Foliennummernplatzhalter 3"/>
+          <p:cNvSpPr>
+            <a:spLocks noGrp="1"/>
+          </p:cNvSpPr>
+          <p:nvPr>
+            <p:ph type="sldNum" sz="quarter" idx="5"/>
+          </p:nvPr>
+        </p:nvSpPr>
+        <p:spPr/>
+        <p:txBody>
+          <a:bodyPr/>
+          <a:lstStyle/>
+          <a:p>
+            <a:fld id="{F08FA16D-42E2-4EC7-990B-293656F6391E}" type="slidenum">
+              <a:rPr lang="de-DE" smtClean="0"/>
+              <a:t>7</a:t>
+            </a:fld>
+            <a:endParaRPr lang="de-DE"/>
+          </a:p>
+        </p:txBody>
+      </p:sp>
+    </p:spTree>
+    <p:extLst>
+      <p:ext uri="{BB962C8B-B14F-4D97-AF65-F5344CB8AC3E}">
+        <p14:creationId xmlns:p14="http://schemas.microsoft.com/office/powerpoint/2010/main" val="1097626354"/>
+      </p:ext>
+    </p:extLst>
+  </p:cSld>
+  <p:clrMapOvr>
+    <a:masterClrMapping/>
+  </p:clrMapOvr>
+</p:notes>
+</file>
+
+<file path=ppt/notesSlides/notesSlide8.xml><?xml version="1.0" encoding="utf-8"?>
+<p:notes xmlns:a="http://schemas.openxmlformats.org/drawingml/2006/main" xmlns:r="http://schemas.openxmlformats.org/officeDocument/2006/relationships" xmlns:p="http://schemas.openxmlformats.org/presentationml/2006/main">
+  <p:cSld>
+    <p:spTree>
+      <p:nvGrpSpPr>
+        <p:cNvPr id="1" name=""/>
+        <p:cNvGrpSpPr/>
+        <p:nvPr/>
+      </p:nvGrpSpPr>
+      <p:grpSpPr>
+        <a:xfrm>
+          <a:off x="0" y="0"/>
+          <a:ext cx="0" cy="0"/>
+          <a:chOff x="0" y="0"/>
+          <a:chExt cx="0" cy="0"/>
+        </a:xfrm>
+      </p:grpSpPr>
+      <p:sp>
+        <p:nvSpPr>
+          <p:cNvPr id="2" name="Folienbildplatzhalter 1"/>
+          <p:cNvSpPr>
+            <a:spLocks noGrp="1" noRot="1" noChangeAspect="1"/>
+          </p:cNvSpPr>
+          <p:nvPr>
+            <p:ph type="sldImg"/>
+          </p:nvPr>
+        </p:nvSpPr>
+        <p:spPr/>
+      </p:sp>
+      <p:sp>
+        <p:nvSpPr>
+          <p:cNvPr id="3" name="Notizenplatzhalter 2"/>
+          <p:cNvSpPr>
+            <a:spLocks noGrp="1"/>
+          </p:cNvSpPr>
+          <p:nvPr>
+            <p:ph type="body" idx="1"/>
+          </p:nvPr>
+        </p:nvSpPr>
+        <p:spPr/>
+        <p:txBody>
+          <a:bodyPr/>
+          <a:lstStyle/>
+          <a:p>
+            <a:r>
+              <a:rPr lang="de-DE" dirty="0" err="1"/>
+              <a:t>Fatzit</a:t>
+            </a:r>
+            <a:r>
+              <a:rPr lang="de-DE" dirty="0"/>
+              <a:t> für mich:</a:t>
+            </a:r>
+          </a:p>
+          <a:p>
+            <a:endParaRPr lang="de-DE" dirty="0"/>
+          </a:p>
+          <a:p>
+            <a:pPr marL="342900" indent="-342900" algn="l">
+              <a:buFont typeface="Arial" panose="020B0604020202020204" pitchFamily="34" charset="0"/>
+              <a:buChar char="•"/>
+            </a:pPr>
+            <a:r>
+              <a:rPr lang="de-DE" sz="1200" dirty="0">
+                <a:solidFill>
+                  <a:srgbClr val="FFFFFF"/>
+                </a:solidFill>
+              </a:rPr>
+              <a:t>Nicht nur auf Ordnerstruktur achten (sondern auch den Code beachten)</a:t>
+            </a:r>
+          </a:p>
+          <a:p>
+            <a:pPr marL="342900" indent="-342900" algn="l">
+              <a:buFont typeface="Arial" panose="020B0604020202020204" pitchFamily="34" charset="0"/>
+              <a:buChar char="•"/>
+            </a:pPr>
+            <a:r>
+              <a:rPr lang="de-DE" sz="1200" dirty="0">
+                <a:solidFill>
+                  <a:srgbClr val="FFFFFF"/>
+                </a:solidFill>
+              </a:rPr>
+              <a:t>Projektgröße im Vorfeld beachten</a:t>
+            </a:r>
+          </a:p>
+          <a:p>
+            <a:pPr marL="342900" indent="-342900" algn="l">
+              <a:buFont typeface="Arial" panose="020B0604020202020204" pitchFamily="34" charset="0"/>
+              <a:buChar char="•"/>
+            </a:pPr>
+            <a:r>
+              <a:rPr lang="de-DE" sz="1200" dirty="0">
+                <a:solidFill>
+                  <a:srgbClr val="FFFFFF"/>
+                </a:solidFill>
+              </a:rPr>
+              <a:t>Erst „Head“ </a:t>
+            </a:r>
+            <a:r>
+              <a:rPr lang="de-DE" sz="1200" dirty="0" err="1">
+                <a:solidFill>
+                  <a:srgbClr val="FFFFFF"/>
+                </a:solidFill>
+              </a:rPr>
+              <a:t>Footer</a:t>
+            </a:r>
+            <a:r>
+              <a:rPr lang="de-DE" sz="1200" dirty="0">
+                <a:solidFill>
+                  <a:srgbClr val="FFFFFF"/>
+                </a:solidFill>
+              </a:rPr>
+              <a:t>“ responsive Display, dann erst Inhalt</a:t>
+            </a:r>
+          </a:p>
+          <a:p>
+            <a:pPr marL="342900" indent="-342900" algn="l">
+              <a:buFont typeface="Arial" panose="020B0604020202020204" pitchFamily="34" charset="0"/>
+              <a:buChar char="•"/>
+            </a:pPr>
+            <a:r>
+              <a:rPr lang="de-DE" sz="1200" dirty="0">
+                <a:solidFill>
+                  <a:srgbClr val="FFFFFF"/>
+                </a:solidFill>
+              </a:rPr>
+              <a:t>Classen genauer beschreiben (Clean Code)</a:t>
+            </a:r>
+          </a:p>
+          <a:p>
+            <a:pPr marL="342900" indent="-342900" algn="l">
+              <a:buFont typeface="Arial" panose="020B0604020202020204" pitchFamily="34" charset="0"/>
+              <a:buChar char="•"/>
+            </a:pPr>
+            <a:r>
+              <a:rPr lang="de-DE" sz="1200" dirty="0">
+                <a:solidFill>
+                  <a:srgbClr val="FFFFFF"/>
+                </a:solidFill>
+              </a:rPr>
+              <a:t>Bilder auf unterschiedliche Weise fotografieren</a:t>
+            </a:r>
+          </a:p>
+          <a:p>
+            <a:endParaRPr lang="de-DE" dirty="0"/>
+          </a:p>
+        </p:txBody>
+      </p:sp>
+      <p:sp>
+        <p:nvSpPr>
+          <p:cNvPr id="4" name="Foliennummernplatzhalter 3"/>
+          <p:cNvSpPr>
+            <a:spLocks noGrp="1"/>
+          </p:cNvSpPr>
+          <p:nvPr>
+            <p:ph type="sldNum" sz="quarter" idx="5"/>
+          </p:nvPr>
+        </p:nvSpPr>
+        <p:spPr/>
+        <p:txBody>
+          <a:bodyPr/>
+          <a:lstStyle/>
+          <a:p>
+            <a:fld id="{F08FA16D-42E2-4EC7-990B-293656F6391E}" type="slidenum">
+              <a:rPr lang="de-DE" smtClean="0"/>
+              <a:t>8</a:t>
+            </a:fld>
+            <a:endParaRPr lang="de-DE"/>
+          </a:p>
+        </p:txBody>
+      </p:sp>
+    </p:spTree>
+    <p:extLst>
+      <p:ext uri="{BB962C8B-B14F-4D97-AF65-F5344CB8AC3E}">
+        <p14:creationId xmlns:p14="http://schemas.microsoft.com/office/powerpoint/2010/main" val="3236938401"/>
+      </p:ext>
+    </p:extLst>
+  </p:cSld>
+  <p:clrMapOvr>
+    <a:masterClrMapping/>
+  </p:clrMapOvr>
+</p:notes>
+</file>
+
 <file path=ppt/slideLayouts/slideLayout1.xml><?xml version="1.0" encoding="utf-8"?>
 <p:sldLayout xmlns:a="http://schemas.openxmlformats.org/drawingml/2006/main" xmlns:r="http://schemas.openxmlformats.org/officeDocument/2006/relationships" xmlns:p="http://schemas.openxmlformats.org/presentationml/2006/main" type="title" preserve="1">
   <p:cSld name="Titelfolie">
@@ -618,7 +2271,7 @@
           <a:p>
             <a:fld id="{A5E3BF73-4A05-48E7-9426-004BD2C6CF57}" type="datetime1">
               <a:rPr lang="de-DE" smtClean="0"/>
-              <a:t>05.05.2021</a:t>
+              <a:t>06.05.2021</a:t>
             </a:fld>
             <a:endParaRPr lang="de-DE"/>
           </a:p>
@@ -816,7 +2469,7 @@
           <a:p>
             <a:fld id="{64693763-414D-4AB3-ADC8-E303C7171EA6}" type="datetime1">
               <a:rPr lang="de-DE" smtClean="0"/>
-              <a:t>05.05.2021</a:t>
+              <a:t>06.05.2021</a:t>
             </a:fld>
             <a:endParaRPr lang="de-DE"/>
           </a:p>
@@ -1024,7 +2677,7 @@
           <a:p>
             <a:fld id="{4DF3405B-40D5-4B34-B144-8D8AB5F7B046}" type="datetime1">
               <a:rPr lang="de-DE" smtClean="0"/>
-              <a:t>05.05.2021</a:t>
+              <a:t>06.05.2021</a:t>
             </a:fld>
             <a:endParaRPr lang="de-DE"/>
           </a:p>
@@ -1222,7 +2875,7 @@
           <a:p>
             <a:fld id="{AE5BA4AF-7B4F-40E1-B568-A133CDD13DF5}" type="datetime1">
               <a:rPr lang="de-DE" smtClean="0"/>
-              <a:t>05.05.2021</a:t>
+              <a:t>06.05.2021</a:t>
             </a:fld>
             <a:endParaRPr lang="de-DE"/>
           </a:p>
@@ -1497,7 +3150,7 @@
           <a:p>
             <a:fld id="{ED0506EC-3122-446A-9203-FC16ADCCF2D8}" type="datetime1">
               <a:rPr lang="de-DE" smtClean="0"/>
-              <a:t>05.05.2021</a:t>
+              <a:t>06.05.2021</a:t>
             </a:fld>
             <a:endParaRPr lang="de-DE"/>
           </a:p>
@@ -1762,7 +3415,7 @@
           <a:p>
             <a:fld id="{21126BF3-841F-418C-8638-725F940C7E23}" type="datetime1">
               <a:rPr lang="de-DE" smtClean="0"/>
-              <a:t>05.05.2021</a:t>
+              <a:t>06.05.2021</a:t>
             </a:fld>
             <a:endParaRPr lang="de-DE"/>
           </a:p>
@@ -2174,7 +3827,7 @@
           <a:p>
             <a:fld id="{074E0394-C465-47C6-BA79-53E9DC35947C}" type="datetime1">
               <a:rPr lang="de-DE" smtClean="0"/>
-              <a:t>05.05.2021</a:t>
+              <a:t>06.05.2021</a:t>
             </a:fld>
             <a:endParaRPr lang="de-DE"/>
           </a:p>
@@ -2315,7 +3968,7 @@
           <a:p>
             <a:fld id="{9A221D23-093F-4998-9637-01F0FA25821C}" type="datetime1">
               <a:rPr lang="de-DE" smtClean="0"/>
-              <a:t>05.05.2021</a:t>
+              <a:t>06.05.2021</a:t>
             </a:fld>
             <a:endParaRPr lang="de-DE"/>
           </a:p>
@@ -2428,7 +4081,7 @@
           <a:p>
             <a:fld id="{E097D4E3-7B9C-45FD-9441-A5CDFA57C341}" type="datetime1">
               <a:rPr lang="de-DE" smtClean="0"/>
-              <a:t>05.05.2021</a:t>
+              <a:t>06.05.2021</a:t>
             </a:fld>
             <a:endParaRPr lang="de-DE"/>
           </a:p>
@@ -2739,7 +4392,7 @@
           <a:p>
             <a:fld id="{77448468-387A-4904-B291-79B691D6C768}" type="datetime1">
               <a:rPr lang="de-DE" smtClean="0"/>
-              <a:t>05.05.2021</a:t>
+              <a:t>06.05.2021</a:t>
             </a:fld>
             <a:endParaRPr lang="de-DE"/>
           </a:p>
@@ -3027,7 +4680,7 @@
           <a:p>
             <a:fld id="{C87F5BC3-7AC4-4E1A-BFCE-4923438F3F2A}" type="datetime1">
               <a:rPr lang="de-DE" smtClean="0"/>
-              <a:t>05.05.2021</a:t>
+              <a:t>06.05.2021</a:t>
             </a:fld>
             <a:endParaRPr lang="de-DE"/>
           </a:p>
@@ -3268,7 +4921,7 @@
           <a:p>
             <a:fld id="{EE8D0C81-F321-4416-B982-688589C04892}" type="datetime1">
               <a:rPr lang="de-DE" smtClean="0"/>
-              <a:t>05.05.2021</a:t>
+              <a:t>06.05.2021</a:t>
             </a:fld>
             <a:endParaRPr lang="de-DE"/>
           </a:p>
@@ -8860,7 +10513,7 @@
           <p:nvPr/>
         </p:nvPicPr>
         <p:blipFill>
-          <a:blip r:embed="rId2">
+          <a:blip r:embed="rId3">
             <a:extLst>
               <a:ext uri="{28A0092B-C50C-407E-A947-70E740481C1C}">
                 <a14:useLocalDpi xmlns:a14="http://schemas.microsoft.com/office/drawing/2010/main" val="0"/>
@@ -8896,7 +10549,7 @@
           <p:nvPr/>
         </p:nvPicPr>
         <p:blipFill>
-          <a:blip r:embed="rId3">
+          <a:blip r:embed="rId4">
             <a:extLst>
               <a:ext uri="{28A0092B-C50C-407E-A947-70E740481C1C}">
                 <a14:useLocalDpi xmlns:a14="http://schemas.microsoft.com/office/drawing/2010/main" val="0"/>
@@ -8935,7 +10588,7 @@
           <p:nvPr/>
         </p:nvPicPr>
         <p:blipFill>
-          <a:blip r:embed="rId4">
+          <a:blip r:embed="rId5">
             <a:extLst>
               <a:ext uri="{28A0092B-C50C-407E-A947-70E740481C1C}">
                 <a14:useLocalDpi xmlns:a14="http://schemas.microsoft.com/office/drawing/2010/main" val="0"/>
@@ -9024,7 +10677,7 @@
           <p:nvPr/>
         </p:nvPicPr>
         <p:blipFill>
-          <a:blip r:embed="rId5">
+          <a:blip r:embed="rId6">
             <a:extLst>
               <a:ext uri="{28A0092B-C50C-407E-A947-70E740481C1C}">
                 <a14:useLocalDpi xmlns:a14="http://schemas.microsoft.com/office/drawing/2010/main" val="0"/>
@@ -9060,7 +10713,7 @@
           <p:nvPr/>
         </p:nvPicPr>
         <p:blipFill>
-          <a:blip r:embed="rId6">
+          <a:blip r:embed="rId7">
             <a:extLst>
               <a:ext uri="{28A0092B-C50C-407E-A947-70E740481C1C}">
                 <a14:useLocalDpi xmlns:a14="http://schemas.microsoft.com/office/drawing/2010/main" val="0"/>
@@ -10929,7 +12582,7 @@
           <p:nvPr/>
         </p:nvPicPr>
         <p:blipFill>
-          <a:blip r:embed="rId2">
+          <a:blip r:embed="rId3">
             <a:extLst>
               <a:ext uri="{28A0092B-C50C-407E-A947-70E740481C1C}">
                 <a14:useLocalDpi xmlns:a14="http://schemas.microsoft.com/office/drawing/2010/main" val="0"/>
@@ -12401,7 +14054,7 @@
           <p:nvPr/>
         </p:nvPicPr>
         <p:blipFill>
-          <a:blip r:embed="rId2">
+          <a:blip r:embed="rId3">
             <a:extLst>
               <a:ext uri="{28A0092B-C50C-407E-A947-70E740481C1C}">
                 <a14:useLocalDpi xmlns:a14="http://schemas.microsoft.com/office/drawing/2010/main" val="0"/>
@@ -12442,7 +14095,7 @@
           <p:nvPr/>
         </p:nvPicPr>
         <p:blipFill>
-          <a:blip r:embed="rId3">
+          <a:blip r:embed="rId4">
             <a:extLst>
               <a:ext uri="{28A0092B-C50C-407E-A947-70E740481C1C}">
                 <a14:useLocalDpi xmlns:a14="http://schemas.microsoft.com/office/drawing/2010/main" val="0"/>
@@ -12483,7 +14136,7 @@
           <p:nvPr/>
         </p:nvPicPr>
         <p:blipFill>
-          <a:blip r:embed="rId4">
+          <a:blip r:embed="rId5">
             <a:extLst>
               <a:ext uri="{28A0092B-C50C-407E-A947-70E740481C1C}">
                 <a14:useLocalDpi xmlns:a14="http://schemas.microsoft.com/office/drawing/2010/main" val="0"/>
@@ -13423,7 +15076,7 @@
           <p:nvPr/>
         </p:nvPicPr>
         <p:blipFill>
-          <a:blip r:embed="rId2">
+          <a:blip r:embed="rId3">
             <a:extLst>
               <a:ext uri="{28A0092B-C50C-407E-A947-70E740481C1C}">
                 <a14:useLocalDpi xmlns:a14="http://schemas.microsoft.com/office/drawing/2010/main" val="0"/>
@@ -13464,7 +15117,7 @@
           <p:nvPr/>
         </p:nvPicPr>
         <p:blipFill>
-          <a:blip r:embed="rId3">
+          <a:blip r:embed="rId4">
             <a:extLst>
               <a:ext uri="{28A0092B-C50C-407E-A947-70E740481C1C}">
                 <a14:useLocalDpi xmlns:a14="http://schemas.microsoft.com/office/drawing/2010/main" val="0"/>
@@ -13505,7 +15158,7 @@
           <p:nvPr/>
         </p:nvPicPr>
         <p:blipFill>
-          <a:blip r:embed="rId4">
+          <a:blip r:embed="rId5">
             <a:extLst>
               <a:ext uri="{28A0092B-C50C-407E-A947-70E740481C1C}">
                 <a14:useLocalDpi xmlns:a14="http://schemas.microsoft.com/office/drawing/2010/main" val="0"/>
@@ -14573,23 +16226,7 @@
                   <a:srgbClr val="FFFFFF"/>
                 </a:solidFill>
               </a:rPr>
-              <a:t>“ </a:t>
-            </a:r>
-            <a:r>
-              <a:rPr lang="de-DE" sz="2800">
-                <a:solidFill>
-                  <a:srgbClr val="FFFFFF"/>
-                </a:solidFill>
-              </a:rPr>
-              <a:t>responsive Display, </a:t>
-            </a:r>
-            <a:r>
-              <a:rPr lang="de-DE" sz="2800" dirty="0">
-                <a:solidFill>
-                  <a:srgbClr val="FFFFFF"/>
-                </a:solidFill>
-              </a:rPr>
-              <a:t>dann erst Inhalt</a:t>
+              <a:t>“ responsive Display, dann erst Inhalt</a:t>
             </a:r>
           </a:p>
           <a:p>

</xml_diff>